<commit_message>
lectura guias 10-01, 10-10
</commit_message>
<xml_diff>
--- a/fuentes/contenidos/grado10/guion01/CN_10_01_CO.pptx
+++ b/fuentes/contenidos/grado10/guion01/CN_10_01_CO.pptx
@@ -467,7 +467,7 @@
           <a:p>
             <a:fld id="{5001C876-01F7-4317-94B9-1AE222133113}" type="datetimeFigureOut">
               <a:rPr lang="es-ES" smtClean="0"/>
-              <a:t>02/05/2016</a:t>
+              <a:t>09/05/2016</a:t>
             </a:fld>
             <a:endParaRPr lang="es-ES"/>
           </a:p>
@@ -1079,7 +1079,27 @@
             <a:pPr algn="ctr"/>
             <a:r>
               <a:rPr lang="es-CO" dirty="0"/>
-              <a:t>El mundo de la Física y la Química</a:t>
+              <a:t>El mundo de </a:t>
+            </a:r>
+            <a:r>
+              <a:rPr lang="es-CO"/>
+              <a:t>la </a:t>
+            </a:r>
+            <a:r>
+              <a:rPr lang="es-CO" smtClean="0"/>
+              <a:t>física </a:t>
+            </a:r>
+            <a:r>
+              <a:rPr lang="es-CO" dirty="0"/>
+              <a:t>y </a:t>
+            </a:r>
+            <a:r>
+              <a:rPr lang="es-CO"/>
+              <a:t>la </a:t>
+            </a:r>
+            <a:r>
+              <a:rPr lang="es-CO" smtClean="0"/>
+              <a:t>química</a:t>
             </a:r>
             <a:endParaRPr lang="es-ES" sz="1600" dirty="0"/>
           </a:p>
@@ -1325,11 +1345,6 @@
               </a:rPr>
               <a:t>composición.</a:t>
             </a:r>
-            <a:endParaRPr lang="es-ES_tradnl" sz="1000" dirty="0" smtClean="0">
-              <a:solidFill>
-                <a:schemeClr val="bg1"/>
-              </a:solidFill>
-            </a:endParaRPr>
           </a:p>
           <a:p>
             <a:pPr marL="171450" indent="-171450">
@@ -1342,21 +1357,8 @@
                   <a:schemeClr val="bg1"/>
                 </a:solidFill>
               </a:rPr>
-              <a:t>o</a:t>
-            </a:r>
-            <a:r>
-              <a:rPr lang="es-ES_tradnl" sz="1000" dirty="0" smtClean="0">
-                <a:solidFill>
-                  <a:schemeClr val="bg1"/>
-                </a:solidFill>
-              </a:rPr>
-              <a:t>rganización.</a:t>
-            </a:r>
-            <a:endParaRPr lang="es-ES_tradnl" sz="1000" dirty="0" smtClean="0">
-              <a:solidFill>
-                <a:schemeClr val="bg1"/>
-              </a:solidFill>
-            </a:endParaRPr>
+              <a:t>organización.</a:t>
+            </a:r>
           </a:p>
           <a:p>
             <a:pPr marL="171450" indent="-171450">
@@ -1369,21 +1371,8 @@
                   <a:schemeClr val="bg1"/>
                 </a:solidFill>
               </a:rPr>
-              <a:t>t</a:t>
-            </a:r>
-            <a:r>
-              <a:rPr lang="es-ES_tradnl" sz="1000" dirty="0" smtClean="0">
-                <a:solidFill>
-                  <a:schemeClr val="bg1"/>
-                </a:solidFill>
-              </a:rPr>
-              <a:t>ransformaciones.</a:t>
-            </a:r>
-            <a:endParaRPr lang="es-ES_tradnl" sz="1000" dirty="0" smtClean="0">
-              <a:solidFill>
-                <a:schemeClr val="bg1"/>
-              </a:solidFill>
-            </a:endParaRPr>
+              <a:t>transformaciones.</a:t>
+            </a:r>
           </a:p>
           <a:p>
             <a:pPr marL="171450" indent="-171450">
@@ -1396,21 +1385,8 @@
                   <a:schemeClr val="bg1"/>
                 </a:solidFill>
               </a:rPr>
-              <a:t>p</a:t>
-            </a:r>
-            <a:r>
-              <a:rPr lang="es-ES_tradnl" sz="1000" dirty="0" smtClean="0">
-                <a:solidFill>
-                  <a:schemeClr val="bg1"/>
-                </a:solidFill>
-              </a:rPr>
-              <a:t>ropiedades.</a:t>
-            </a:r>
-            <a:endParaRPr lang="es-ES_tradnl" sz="1000" dirty="0" smtClean="0">
-              <a:solidFill>
-                <a:schemeClr val="bg1"/>
-              </a:solidFill>
-            </a:endParaRPr>
+              <a:t>propiedades.</a:t>
+            </a:r>
           </a:p>
           <a:p>
             <a:pPr marL="171450" indent="-171450">
@@ -1431,15 +1407,7 @@
                   <a:schemeClr val="bg1"/>
                 </a:solidFill>
               </a:rPr>
-              <a:t>lasificación </a:t>
-            </a:r>
-            <a:r>
-              <a:rPr lang="es-ES_tradnl" sz="1000" dirty="0" smtClean="0">
-                <a:solidFill>
-                  <a:schemeClr val="bg1"/>
-                </a:solidFill>
-              </a:rPr>
-              <a:t>sistemática de la materia y sus relaciones con la energía</a:t>
+              <a:t>lasificación sistemática de la materia y sus relaciones con la energía</a:t>
             </a:r>
           </a:p>
         </p:txBody>
@@ -1504,11 +1472,6 @@
               </a:rPr>
               <a:t>empíricas o experimentales</a:t>
             </a:r>
-            <a:endParaRPr lang="es-ES_tradnl" sz="1000" dirty="0">
-              <a:solidFill>
-                <a:schemeClr val="bg1"/>
-              </a:solidFill>
-            </a:endParaRPr>
           </a:p>
         </p:txBody>
       </p:sp>
@@ -1573,15 +1536,7 @@
             <a:pPr algn="ctr"/>
             <a:r>
               <a:rPr lang="es-ES_tradnl" sz="900" dirty="0" smtClean="0"/>
-              <a:t>se </a:t>
-            </a:r>
-            <a:r>
-              <a:rPr lang="es-ES_tradnl" sz="900" dirty="0" smtClean="0"/>
-              <a:t>caracteriza </a:t>
-            </a:r>
-            <a:r>
-              <a:rPr lang="es-ES_tradnl" sz="900" dirty="0" smtClean="0"/>
-              <a:t>por ser</a:t>
+              <a:t>se caracteriza por ser</a:t>
             </a:r>
             <a:endParaRPr lang="es-ES" sz="900" dirty="0"/>
           </a:p>
@@ -1647,11 +1602,6 @@
               </a:rPr>
               <a:t>formales</a:t>
             </a:r>
-            <a:endParaRPr lang="es-ES_tradnl" sz="1000" dirty="0">
-              <a:solidFill>
-                <a:schemeClr val="bg1"/>
-              </a:solidFill>
-            </a:endParaRPr>
           </a:p>
         </p:txBody>
       </p:sp>
@@ -1921,7 +1871,6 @@
               <a:rPr lang="es-ES" sz="900" dirty="0"/>
               <a:t>abstractos</a:t>
             </a:r>
-            <a:endParaRPr lang="es-ES" sz="900" dirty="0"/>
           </a:p>
         </p:txBody>
       </p:sp>
@@ -2235,15 +2184,7 @@
                   <a:schemeClr val="bg1"/>
                 </a:solidFill>
               </a:rPr>
-              <a:t>conjunto </a:t>
-            </a:r>
-            <a:r>
-              <a:rPr lang="es-ES" sz="1000" dirty="0" smtClean="0">
-                <a:solidFill>
-                  <a:schemeClr val="bg1"/>
-                </a:solidFill>
-              </a:rPr>
-              <a:t>de conocimientos objetivos verificables y ordenados</a:t>
+              <a:t>conjunto de conocimientos objetivos verificables y ordenados</a:t>
             </a:r>
             <a:endParaRPr lang="es-ES" sz="1000" dirty="0">
               <a:solidFill>
@@ -2402,11 +2343,7 @@
             </a:r>
             <a:r>
               <a:rPr lang="es-ES_tradnl" sz="900" dirty="0" smtClean="0"/>
-              <a:t>étodo </a:t>
-            </a:r>
-            <a:r>
-              <a:rPr lang="es-ES_tradnl" sz="900" dirty="0" smtClean="0"/>
-              <a:t>científico</a:t>
+              <a:t>étodo científico</a:t>
             </a:r>
             <a:endParaRPr lang="es-ES" sz="900" dirty="0">
               <a:solidFill>
@@ -2475,11 +2412,7 @@
             <a:pPr algn="ctr"/>
             <a:r>
               <a:rPr lang="es-ES_tradnl" sz="900" dirty="0" smtClean="0"/>
-              <a:t>consiste </a:t>
-            </a:r>
-            <a:r>
-              <a:rPr lang="es-ES_tradnl" sz="900" dirty="0" smtClean="0"/>
-              <a:t>en</a:t>
+              <a:t>consiste en</a:t>
             </a:r>
             <a:endParaRPr lang="es-ES" sz="900" dirty="0"/>
           </a:p>
@@ -2536,37 +2469,8 @@
                   <a:schemeClr val="tx1"/>
                 </a:solidFill>
               </a:rPr>
-              <a:t>o</a:t>
-            </a:r>
-            <a:r>
-              <a:rPr lang="es-ES" sz="900" dirty="0" smtClean="0">
-                <a:solidFill>
-                  <a:schemeClr val="tx1"/>
-                </a:solidFill>
-              </a:rPr>
-              <a:t>bservación </a:t>
-            </a:r>
-            <a:r>
-              <a:rPr lang="es-ES" sz="900" dirty="0" smtClean="0">
-                <a:solidFill>
-                  <a:schemeClr val="tx1"/>
-                </a:solidFill>
-              </a:rPr>
-              <a:t>y planteamiento del </a:t>
-            </a:r>
-            <a:r>
-              <a:rPr lang="es-ES" sz="900" dirty="0" smtClean="0">
-                <a:solidFill>
-                  <a:schemeClr val="tx1"/>
-                </a:solidFill>
-              </a:rPr>
-              <a:t>problema.</a:t>
-            </a:r>
-            <a:endParaRPr lang="es-ES" sz="900" dirty="0" smtClean="0">
-              <a:solidFill>
-                <a:schemeClr val="tx1"/>
-              </a:solidFill>
-            </a:endParaRPr>
+              <a:t>observación y planteamiento del problema.</a:t>
+            </a:r>
           </a:p>
           <a:p>
             <a:pPr marL="171450" indent="-171450">
@@ -2587,29 +2491,8 @@
                   <a:schemeClr val="tx1"/>
                 </a:solidFill>
               </a:rPr>
-              <a:t>ormulación </a:t>
-            </a:r>
-            <a:r>
-              <a:rPr lang="es-ES" sz="900" dirty="0" smtClean="0">
-                <a:solidFill>
-                  <a:schemeClr val="tx1"/>
-                </a:solidFill>
-              </a:rPr>
-              <a:t>de la </a:t>
-            </a:r>
-            <a:r>
-              <a:rPr lang="es-ES" sz="900" dirty="0" smtClean="0">
-                <a:solidFill>
-                  <a:schemeClr val="tx1"/>
-                </a:solidFill>
-              </a:rPr>
-              <a:t>hipótesis.</a:t>
-            </a:r>
-            <a:endParaRPr lang="es-ES" sz="900" dirty="0" smtClean="0">
-              <a:solidFill>
-                <a:schemeClr val="tx1"/>
-              </a:solidFill>
-            </a:endParaRPr>
+              <a:t>ormulación de la hipótesis.</a:t>
+            </a:r>
           </a:p>
           <a:p>
             <a:pPr marL="171450" indent="-171450">
@@ -2630,29 +2513,8 @@
                   <a:schemeClr val="tx1"/>
                 </a:solidFill>
               </a:rPr>
-              <a:t>erificación </a:t>
-            </a:r>
-            <a:r>
-              <a:rPr lang="es-ES" sz="900" dirty="0" smtClean="0">
-                <a:solidFill>
-                  <a:schemeClr val="tx1"/>
-                </a:solidFill>
-              </a:rPr>
-              <a:t>de la </a:t>
-            </a:r>
-            <a:r>
-              <a:rPr lang="es-ES" sz="900" dirty="0" smtClean="0">
-                <a:solidFill>
-                  <a:schemeClr val="tx1"/>
-                </a:solidFill>
-              </a:rPr>
-              <a:t>hipótesis.</a:t>
-            </a:r>
-            <a:endParaRPr lang="es-ES" sz="900" dirty="0" smtClean="0">
-              <a:solidFill>
-                <a:schemeClr val="tx1"/>
-              </a:solidFill>
-            </a:endParaRPr>
+              <a:t>erificación de la hipótesis.</a:t>
+            </a:r>
           </a:p>
           <a:p>
             <a:pPr marL="171450" indent="-171450">
@@ -2673,23 +2535,7 @@
                   <a:schemeClr val="tx1"/>
                 </a:solidFill>
               </a:rPr>
-              <a:t>stablecimiento </a:t>
-            </a:r>
-            <a:r>
-              <a:rPr lang="es-ES" sz="900" dirty="0" smtClean="0">
-                <a:solidFill>
-                  <a:schemeClr val="tx1"/>
-                </a:solidFill>
-              </a:rPr>
-              <a:t>de </a:t>
-            </a:r>
-            <a:r>
-              <a:rPr lang="es-ES" sz="900" dirty="0" smtClean="0">
-                <a:solidFill>
-                  <a:schemeClr val="tx1"/>
-                </a:solidFill>
-              </a:rPr>
-              <a:t>teorías.</a:t>
+              <a:t>stablecimiento de teorías.</a:t>
             </a:r>
             <a:endParaRPr lang="es-ES" sz="900" dirty="0">
               <a:solidFill>
@@ -2987,7 +2833,6 @@
               <a:rPr lang="es-ES" sz="900" dirty="0"/>
               <a:t>abstractos</a:t>
             </a:r>
-            <a:endParaRPr lang="es-ES" sz="900" dirty="0"/>
           </a:p>
         </p:txBody>
       </p:sp>
@@ -3177,11 +3022,7 @@
           <a:p>
             <a:r>
               <a:rPr lang="en-US" dirty="0" err="1"/>
-              <a:t>c</a:t>
-            </a:r>
-            <a:r>
-              <a:rPr lang="en-US" dirty="0" err="1"/>
-              <a:t>omo</a:t>
+              <a:t>como</a:t>
             </a:r>
             <a:r>
               <a:rPr lang="en-US" dirty="0"/>
@@ -3746,15 +3587,7 @@
                   <a:schemeClr val="bg1"/>
                 </a:solidFill>
               </a:rPr>
-              <a:t>ropiedades </a:t>
-            </a:r>
-            <a:r>
-              <a:rPr lang="es-ES_tradnl" sz="1000" dirty="0" smtClean="0">
-                <a:solidFill>
-                  <a:schemeClr val="bg1"/>
-                </a:solidFill>
-              </a:rPr>
-              <a:t>y leyes que rigen el comportamiento de la materia y la energía.</a:t>
+              <a:t>ropiedades y leyes que rigen el comportamiento de la materia y la energía.</a:t>
             </a:r>
           </a:p>
           <a:p>
@@ -3770,11 +3603,6 @@
               </a:rPr>
               <a:t>tiempo.</a:t>
             </a:r>
-            <a:endParaRPr lang="es-ES_tradnl" sz="1000" dirty="0" smtClean="0">
-              <a:solidFill>
-                <a:schemeClr val="bg1"/>
-              </a:solidFill>
-            </a:endParaRPr>
           </a:p>
           <a:p>
             <a:pPr marL="171450" indent="-171450">
@@ -4000,11 +3828,7 @@
             <a:pPr algn="ctr"/>
             <a:r>
               <a:rPr lang="en-US" sz="900" dirty="0" err="1"/>
-              <a:t>e</a:t>
-            </a:r>
-            <a:r>
-              <a:rPr lang="en-US" sz="900" dirty="0" err="1"/>
-              <a:t>xpresadas</a:t>
+              <a:t>expresadas</a:t>
             </a:r>
             <a:r>
               <a:rPr lang="en-US" sz="900" dirty="0"/>
@@ -4212,17 +4036,8 @@
             </a:r>
             <a:r>
               <a:rPr lang="es-ES_tradnl" sz="900" dirty="0" smtClean="0"/>
-              <a:t>ongitud </a:t>
-            </a:r>
-            <a:r>
-              <a:rPr lang="es-ES_tradnl" sz="900" dirty="0" smtClean="0"/>
-              <a:t>(m</a:t>
-            </a:r>
-            <a:r>
-              <a:rPr lang="es-ES_tradnl" sz="900" dirty="0" smtClean="0"/>
-              <a:t>).</a:t>
-            </a:r>
-            <a:endParaRPr lang="es-ES_tradnl" sz="900" dirty="0" smtClean="0"/>
+              <a:t>ongitud (m).</a:t>
+            </a:r>
           </a:p>
           <a:p>
             <a:pPr marL="171450" indent="-171450">
@@ -4235,29 +4050,8 @@
                   <a:schemeClr val="tx1"/>
                 </a:solidFill>
               </a:rPr>
-              <a:t>masa </a:t>
-            </a:r>
-            <a:r>
-              <a:rPr lang="es-ES_tradnl" sz="900" dirty="0" smtClean="0">
-                <a:solidFill>
-                  <a:schemeClr val="tx1"/>
-                </a:solidFill>
-              </a:rPr>
-              <a:t>(Kg</a:t>
-            </a:r>
-            <a:r>
-              <a:rPr lang="es-ES_tradnl" sz="900" dirty="0" smtClean="0">
-                <a:solidFill>
-                  <a:schemeClr val="tx1"/>
-                </a:solidFill>
-              </a:rPr>
-              <a:t>).</a:t>
-            </a:r>
-            <a:endParaRPr lang="es-ES_tradnl" sz="900" dirty="0" smtClean="0">
-              <a:solidFill>
-                <a:schemeClr val="tx1"/>
-              </a:solidFill>
-            </a:endParaRPr>
+              <a:t>masa (Kg).</a:t>
+            </a:r>
           </a:p>
           <a:p>
             <a:pPr marL="171450" indent="-171450">
@@ -4278,29 +4072,8 @@
                   <a:schemeClr val="tx1"/>
                 </a:solidFill>
               </a:rPr>
-              <a:t>iempo </a:t>
-            </a:r>
-            <a:r>
-              <a:rPr lang="es-ES_tradnl" sz="900" dirty="0" smtClean="0">
-                <a:solidFill>
-                  <a:schemeClr val="tx1"/>
-                </a:solidFill>
-              </a:rPr>
-              <a:t>(s</a:t>
-            </a:r>
-            <a:r>
-              <a:rPr lang="es-ES_tradnl" sz="900" dirty="0" smtClean="0">
-                <a:solidFill>
-                  <a:schemeClr val="tx1"/>
-                </a:solidFill>
-              </a:rPr>
-              <a:t>).</a:t>
-            </a:r>
-            <a:endParaRPr lang="es-ES_tradnl" sz="900" dirty="0" smtClean="0">
-              <a:solidFill>
-                <a:schemeClr val="tx1"/>
-              </a:solidFill>
-            </a:endParaRPr>
+              <a:t>iempo (s).</a:t>
+            </a:r>
           </a:p>
           <a:p>
             <a:pPr marL="171450" indent="-171450">
@@ -4313,29 +4086,8 @@
                   <a:schemeClr val="tx1"/>
                 </a:solidFill>
               </a:rPr>
-              <a:t>temperatura </a:t>
-            </a:r>
-            <a:r>
-              <a:rPr lang="es-ES_tradnl" sz="900" dirty="0" smtClean="0">
-                <a:solidFill>
-                  <a:schemeClr val="tx1"/>
-                </a:solidFill>
-              </a:rPr>
-              <a:t>(k</a:t>
-            </a:r>
-            <a:r>
-              <a:rPr lang="es-ES_tradnl" sz="900" dirty="0" smtClean="0">
-                <a:solidFill>
-                  <a:schemeClr val="tx1"/>
-                </a:solidFill>
-              </a:rPr>
-              <a:t>).</a:t>
-            </a:r>
-            <a:endParaRPr lang="es-ES_tradnl" sz="900" dirty="0" smtClean="0">
-              <a:solidFill>
-                <a:schemeClr val="tx1"/>
-              </a:solidFill>
-            </a:endParaRPr>
+              <a:t>temperatura (k).</a:t>
+            </a:r>
           </a:p>
           <a:p>
             <a:pPr marL="171450" indent="-171450">
@@ -4348,29 +4100,8 @@
                   <a:schemeClr val="tx1"/>
                 </a:solidFill>
               </a:rPr>
-              <a:t>intensidad </a:t>
-            </a:r>
-            <a:r>
-              <a:rPr lang="es-ES_tradnl" sz="900" dirty="0" smtClean="0">
-                <a:solidFill>
-                  <a:schemeClr val="tx1"/>
-                </a:solidFill>
-              </a:rPr>
-              <a:t>corriente (A</a:t>
-            </a:r>
-            <a:r>
-              <a:rPr lang="es-ES_tradnl" sz="900" dirty="0" smtClean="0">
-                <a:solidFill>
-                  <a:schemeClr val="tx1"/>
-                </a:solidFill>
-              </a:rPr>
-              <a:t>).</a:t>
-            </a:r>
-            <a:endParaRPr lang="es-ES_tradnl" sz="900" dirty="0" smtClean="0">
-              <a:solidFill>
-                <a:schemeClr val="tx1"/>
-              </a:solidFill>
-            </a:endParaRPr>
+              <a:t>intensidad corriente (A).</a:t>
+            </a:r>
           </a:p>
           <a:p>
             <a:pPr marL="171450" indent="-171450">
@@ -4391,29 +4122,8 @@
                   <a:schemeClr val="tx1"/>
                 </a:solidFill>
               </a:rPr>
-              <a:t>antidad </a:t>
-            </a:r>
-            <a:r>
-              <a:rPr lang="es-ES_tradnl" sz="900" dirty="0" smtClean="0">
-                <a:solidFill>
-                  <a:schemeClr val="tx1"/>
-                </a:solidFill>
-              </a:rPr>
-              <a:t>de sustancia (mol</a:t>
-            </a:r>
-            <a:r>
-              <a:rPr lang="es-ES_tradnl" sz="900" dirty="0" smtClean="0">
-                <a:solidFill>
-                  <a:schemeClr val="tx1"/>
-                </a:solidFill>
-              </a:rPr>
-              <a:t>).</a:t>
-            </a:r>
-            <a:endParaRPr lang="es-ES_tradnl" sz="900" dirty="0" smtClean="0">
-              <a:solidFill>
-                <a:schemeClr val="tx1"/>
-              </a:solidFill>
-            </a:endParaRPr>
+              <a:t>antidad de sustancia (mol).</a:t>
+            </a:r>
           </a:p>
           <a:p>
             <a:pPr marL="171450" indent="-171450">
@@ -4426,23 +4136,7 @@
                   <a:schemeClr val="tx1"/>
                 </a:solidFill>
               </a:rPr>
-              <a:t>intensidad </a:t>
-            </a:r>
-            <a:r>
-              <a:rPr lang="es-ES_tradnl" sz="900" dirty="0" smtClean="0">
-                <a:solidFill>
-                  <a:schemeClr val="tx1"/>
-                </a:solidFill>
-              </a:rPr>
-              <a:t>luminosa (candela</a:t>
-            </a:r>
-            <a:r>
-              <a:rPr lang="es-ES_tradnl" sz="900" dirty="0" smtClean="0">
-                <a:solidFill>
-                  <a:schemeClr val="tx1"/>
-                </a:solidFill>
-              </a:rPr>
-              <a:t>).</a:t>
+              <a:t>intensidad luminosa (candela).</a:t>
             </a:r>
             <a:endParaRPr lang="es-ES" sz="900" dirty="0">
               <a:solidFill>
@@ -4573,15 +4267,7 @@
                   <a:schemeClr val="tx1"/>
                 </a:solidFill>
               </a:rPr>
-              <a:t>actores </a:t>
-            </a:r>
-            <a:r>
-              <a:rPr lang="es-ES" sz="900" dirty="0" smtClean="0">
-                <a:solidFill>
-                  <a:schemeClr val="tx1"/>
-                </a:solidFill>
-              </a:rPr>
-              <a:t>de conversión</a:t>
+              <a:t>actores de conversión</a:t>
             </a:r>
             <a:endParaRPr lang="es-ES" sz="900" dirty="0">
               <a:solidFill>
@@ -4790,11 +4476,7 @@
             </a:r>
             <a:r>
               <a:rPr lang="es-ES_tradnl" sz="900" dirty="0" smtClean="0"/>
-              <a:t> </a:t>
-            </a:r>
-            <a:r>
-              <a:rPr lang="es-ES_tradnl" sz="900" dirty="0" smtClean="0"/>
-              <a:t>o aleatorios</a:t>
+              <a:t> o aleatorios</a:t>
             </a:r>
             <a:endParaRPr lang="es-ES" sz="900" dirty="0">
               <a:solidFill>
@@ -4925,15 +4607,7 @@
                   <a:schemeClr val="tx1"/>
                 </a:solidFill>
               </a:rPr>
-              <a:t>a </a:t>
-            </a:r>
-            <a:r>
-              <a:rPr lang="es-ES" sz="900" dirty="0" smtClean="0">
-                <a:solidFill>
-                  <a:schemeClr val="tx1"/>
-                </a:solidFill>
-              </a:rPr>
-              <a:t>exactitud y la precisión de las medidas</a:t>
+              <a:t>a exactitud y la precisión de las medidas</a:t>
             </a:r>
             <a:endParaRPr lang="es-ES" sz="900" dirty="0">
               <a:solidFill>
@@ -5048,13 +4722,8 @@
           <a:p>
             <a:r>
               <a:rPr lang="es-ES" dirty="0"/>
-              <a:t>e</a:t>
-            </a:r>
-            <a:r>
-              <a:rPr lang="es-ES" dirty="0"/>
-              <a:t>s el</a:t>
-            </a:r>
-            <a:endParaRPr lang="es-ES" dirty="0"/>
+              <a:t>es el</a:t>
+            </a:r>
           </a:p>
         </p:txBody>
       </p:sp>

</xml_diff>